<commit_message>
updating slides,exercise and index file
</commit_message>
<xml_diff>
--- a/cancergenomics/1610/slides/exercise_wrap_ut.pptx
+++ b/cancergenomics/1610/slides/exercise_wrap_ut.pptx
@@ -3291,19 +3291,7 @@
           <a:p>
             <a:r>
               <a:rPr lang="en-US" dirty="0" smtClean="0"/>
-              <a:t>Alternative</a:t>
-            </a:r>
-            <a:r>
-              <a:rPr lang="en-US" dirty="0" smtClean="0"/>
-              <a:t> </a:t>
-            </a:r>
-            <a:r>
-              <a:rPr lang="en-US" dirty="0" smtClean="0"/>
-              <a:t>Allele </a:t>
-            </a:r>
-            <a:r>
-              <a:rPr lang="en-US" dirty="0" smtClean="0"/>
-              <a:t>Frequency</a:t>
+              <a:t>Alternative Allele Frequency</a:t>
             </a:r>
             <a:endParaRPr lang="en-US" dirty="0"/>
           </a:p>
@@ -3694,7 +3682,6 @@
                 <a:rPr lang="en-US" sz="1400" dirty="0" smtClean="0"/>
                 <a:t>C</a:t>
               </a:r>
-              <a:endParaRPr lang="en-US" sz="1400" dirty="0" smtClean="0"/>
             </a:p>
             <a:p>
               <a:pPr>
@@ -3798,11 +3785,7 @@
           <a:p>
             <a:r>
               <a:rPr lang="en-US" dirty="0" smtClean="0"/>
-              <a:t>AF </a:t>
-            </a:r>
-            <a:r>
-              <a:rPr lang="en-US" dirty="0" smtClean="0"/>
-              <a:t>=   </a:t>
+              <a:t>AF =   </a:t>
             </a:r>
             <a:endParaRPr lang="en-US" dirty="0"/>
           </a:p>
@@ -3868,7 +3851,6 @@
               <a:rPr lang="en-US" dirty="0"/>
               <a:t>A</a:t>
             </a:r>
-            <a:endParaRPr lang="en-US" dirty="0"/>
           </a:p>
         </p:txBody>
       </p:sp>
@@ -3936,11 +3918,7 @@
             </a:r>
             <a:r>
               <a:rPr lang="en-US" dirty="0" smtClean="0"/>
-              <a:t> reads A + # reads </a:t>
-            </a:r>
-            <a:r>
-              <a:rPr lang="en-US" dirty="0" smtClean="0"/>
-              <a:t>C</a:t>
+              <a:t> reads A + # reads C</a:t>
             </a:r>
             <a:endParaRPr lang="en-US" dirty="0"/>
           </a:p>

</xml_diff>